<commit_message>
Auto push 2023-05-09 18:03:18.08
</commit_message>
<xml_diff>
--- a/note/10_2ndTeamProject/sample.pptx
+++ b/note/10_2ndTeamProject/sample.pptx
@@ -251,7 +251,7 @@
           <a:p>
             <a:fld id="{684ABEAC-FD1E-446D-854E-09142DFB339C}" type="datetimeFigureOut">
               <a:rPr lang="ko-KR" altLang="en-US" smtClean="0"/>
-              <a:t>2023-04-17</a:t>
+              <a:t>2023-05-08</a:t>
             </a:fld>
             <a:endParaRPr lang="ko-KR" altLang="en-US"/>
           </a:p>
@@ -416,7 +416,7 @@
           <a:p>
             <a:fld id="{E299D967-67B2-4132-B52D-A253871A1F24}" type="datetimeFigureOut">
               <a:rPr lang="ko-KR" altLang="en-US" smtClean="0"/>
-              <a:t>2023-04-17</a:t>
+              <a:t>2023-05-08</a:t>
             </a:fld>
             <a:endParaRPr lang="ko-KR" altLang="en-US"/>
           </a:p>
@@ -1129,7 +1129,7 @@
           <a:p>
             <a:fld id="{20303F18-CB98-4E85-A37B-EF5A4E6C8DE7}" type="datetime1">
               <a:rPr lang="ko-KR" altLang="en-US" smtClean="0"/>
-              <a:t>2023-04-17</a:t>
+              <a:t>2023-05-08</a:t>
             </a:fld>
             <a:endParaRPr lang="ko-KR" altLang="en-US"/>
           </a:p>
@@ -1304,7 +1304,7 @@
           <a:p>
             <a:fld id="{CCA16C65-58A5-46D5-A762-12670B92641B}" type="datetime1">
               <a:rPr lang="ko-KR" altLang="en-US" smtClean="0"/>
-              <a:t>2023-04-17</a:t>
+              <a:t>2023-05-08</a:t>
             </a:fld>
             <a:endParaRPr lang="ko-KR" altLang="en-US"/>
           </a:p>
@@ -1484,7 +1484,7 @@
           <a:p>
             <a:fld id="{2D09A68A-AC6E-41FE-B28C-2BB812CC2E01}" type="datetime1">
               <a:rPr lang="ko-KR" altLang="en-US" smtClean="0"/>
-              <a:t>2023-04-17</a:t>
+              <a:t>2023-05-08</a:t>
             </a:fld>
             <a:endParaRPr lang="ko-KR" altLang="en-US"/>
           </a:p>
@@ -1654,7 +1654,7 @@
           <a:p>
             <a:fld id="{690B8B09-A0F3-4880-B090-7FDDEE5B5065}" type="datetime1">
               <a:rPr lang="ko-KR" altLang="en-US" smtClean="0"/>
-              <a:t>2023-04-17</a:t>
+              <a:t>2023-05-08</a:t>
             </a:fld>
             <a:endParaRPr lang="ko-KR" altLang="en-US"/>
           </a:p>
@@ -1900,7 +1900,7 @@
           <a:p>
             <a:fld id="{82F7D3F4-816B-4FA6-91FC-91836ECD0E53}" type="datetime1">
               <a:rPr lang="ko-KR" altLang="en-US" smtClean="0"/>
-              <a:t>2023-04-17</a:t>
+              <a:t>2023-05-08</a:t>
             </a:fld>
             <a:endParaRPr lang="ko-KR" altLang="en-US"/>
           </a:p>
@@ -2188,7 +2188,7 @@
           <a:p>
             <a:fld id="{2FB9FCFF-984A-4549-AB53-391F9EC1244A}" type="datetime1">
               <a:rPr lang="ko-KR" altLang="en-US" smtClean="0"/>
-              <a:t>2023-04-17</a:t>
+              <a:t>2023-05-08</a:t>
             </a:fld>
             <a:endParaRPr lang="ko-KR" altLang="en-US"/>
           </a:p>
@@ -2610,7 +2610,7 @@
           <a:p>
             <a:fld id="{94618DE4-C4FE-4171-90C7-38CF01638033}" type="datetime1">
               <a:rPr lang="ko-KR" altLang="en-US" smtClean="0"/>
-              <a:t>2023-04-17</a:t>
+              <a:t>2023-05-08</a:t>
             </a:fld>
             <a:endParaRPr lang="ko-KR" altLang="en-US"/>
           </a:p>
@@ -2728,7 +2728,7 @@
           <a:p>
             <a:fld id="{33587621-9D18-4C20-9B84-3E938621A025}" type="datetime1">
               <a:rPr lang="ko-KR" altLang="en-US" smtClean="0"/>
-              <a:t>2023-04-17</a:t>
+              <a:t>2023-05-08</a:t>
             </a:fld>
             <a:endParaRPr lang="ko-KR" altLang="en-US"/>
           </a:p>
@@ -3414,7 +3414,7 @@
           <a:p>
             <a:fld id="{B517649B-2577-404C-858E-51E9DEBB2548}" type="datetime1">
               <a:rPr lang="ko-KR" altLang="en-US" smtClean="0"/>
-              <a:t>2023-04-17</a:t>
+              <a:t>2023-05-08</a:t>
             </a:fld>
             <a:endParaRPr lang="ko-KR" altLang="en-US"/>
           </a:p>
@@ -3667,7 +3667,7 @@
           <a:p>
             <a:fld id="{8D84C674-EF46-4F27-9E3E-4F6A170B0DC6}" type="datetime1">
               <a:rPr lang="ko-KR" altLang="en-US" smtClean="0"/>
-              <a:t>2023-04-17</a:t>
+              <a:t>2023-05-08</a:t>
             </a:fld>
             <a:endParaRPr lang="ko-KR" altLang="en-US"/>
           </a:p>
@@ -3880,7 +3880,7 @@
           <a:p>
             <a:fld id="{B40F11ED-9D7B-4CCE-A57D-CC1D7760FB25}" type="datetime1">
               <a:rPr lang="ko-KR" altLang="en-US" smtClean="0"/>
-              <a:t>2023-04-17</a:t>
+              <a:t>2023-05-08</a:t>
             </a:fld>
             <a:endParaRPr lang="ko-KR" altLang="en-US"/>
           </a:p>
@@ -5001,14 +5001,6 @@
                 </a:rPr>
                 <a:t>비회원</a:t>
               </a:r>
-              <a:endParaRPr lang="ko-KR" altLang="en-US" sz="1400" b="1" dirty="0">
-                <a:solidFill>
-                  <a:schemeClr val="bg1"/>
-                </a:solidFill>
-                <a:latin typeface="Segoe UI Black" panose="020B0A02040204020203" pitchFamily="34" charset="0"/>
-                <a:ea typeface="다음_SemiBold" panose="02000700060000000000" pitchFamily="2" charset="-127"/>
-                <a:cs typeface="Segoe UI Black" panose="020B0A02040204020203" pitchFamily="34" charset="0"/>
-              </a:endParaRPr>
             </a:p>
           </p:txBody>
         </p:sp>
@@ -5067,14 +5059,6 @@
                 </a:rPr>
                 <a:t>준회원</a:t>
               </a:r>
-              <a:endParaRPr lang="ko-KR" altLang="en-US" sz="1400" b="1" dirty="0">
-                <a:solidFill>
-                  <a:schemeClr val="bg1"/>
-                </a:solidFill>
-                <a:latin typeface="Segoe UI Black" panose="020B0A02040204020203" pitchFamily="34" charset="0"/>
-                <a:ea typeface="다음_SemiBold" panose="02000700060000000000" pitchFamily="2" charset="-127"/>
-                <a:cs typeface="Segoe UI Black" panose="020B0A02040204020203" pitchFamily="34" charset="0"/>
-              </a:endParaRPr>
             </a:p>
           </p:txBody>
         </p:sp>
@@ -5131,27 +5115,8 @@
                   <a:ea typeface="다음_SemiBold" panose="02000700060000000000" pitchFamily="2" charset="-127"/>
                   <a:cs typeface="Segoe UI Black" panose="020B0A02040204020203" pitchFamily="34" charset="0"/>
                 </a:rPr>
-                <a:t>정</a:t>
+                <a:t>정회원</a:t>
               </a:r>
-              <a:r>
-                <a:rPr lang="ko-KR" altLang="en-US" sz="1400" b="1">
-                  <a:solidFill>
-                    <a:schemeClr val="bg1"/>
-                  </a:solidFill>
-                  <a:latin typeface="Segoe UI Black" panose="020B0A02040204020203" pitchFamily="34" charset="0"/>
-                  <a:ea typeface="다음_SemiBold" panose="02000700060000000000" pitchFamily="2" charset="-127"/>
-                  <a:cs typeface="Segoe UI Black" panose="020B0A02040204020203" pitchFamily="34" charset="0"/>
-                </a:rPr>
-                <a:t>회원</a:t>
-              </a:r>
-              <a:endParaRPr lang="ko-KR" altLang="en-US" sz="1400" b="1">
-                <a:solidFill>
-                  <a:schemeClr val="bg1"/>
-                </a:solidFill>
-                <a:latin typeface="Segoe UI Black" panose="020B0A02040204020203" pitchFamily="34" charset="0"/>
-                <a:ea typeface="다음_SemiBold" panose="02000700060000000000" pitchFamily="2" charset="-127"/>
-                <a:cs typeface="Segoe UI Black" panose="020B0A02040204020203" pitchFamily="34" charset="0"/>
-              </a:endParaRPr>
             </a:p>
           </p:txBody>
         </p:sp>
@@ -5210,14 +5175,6 @@
                 </a:rPr>
                 <a:t>우수회원</a:t>
               </a:r>
-              <a:endParaRPr lang="ko-KR" altLang="en-US" sz="1400" b="1">
-                <a:solidFill>
-                  <a:schemeClr val="bg1"/>
-                </a:solidFill>
-                <a:latin typeface="Segoe UI Black" panose="020B0A02040204020203" pitchFamily="34" charset="0"/>
-                <a:ea typeface="다음_SemiBold" panose="02000700060000000000" pitchFamily="2" charset="-127"/>
-                <a:cs typeface="Segoe UI Black" panose="020B0A02040204020203" pitchFamily="34" charset="0"/>
-              </a:endParaRPr>
             </a:p>
           </p:txBody>
         </p:sp>
@@ -5275,13 +5232,6 @@
                 </a:rPr>
                 <a:t>관리자</a:t>
               </a:r>
-              <a:endParaRPr lang="ko-KR" altLang="en-US" sz="1200" b="1">
-                <a:solidFill>
-                  <a:schemeClr val="bg1"/>
-                </a:solidFill>
-                <a:latin typeface="다음_SemiBold" panose="02000700060000000000" pitchFamily="2" charset="-127"/>
-                <a:ea typeface="다음_SemiBold" panose="02000700060000000000" pitchFamily="2" charset="-127"/>
-              </a:endParaRPr>
             </a:p>
           </p:txBody>
         </p:sp>
@@ -5410,17 +5360,7 @@
                   <a:latin typeface="한컴 윤고딕 230" panose="02020603020101020101" pitchFamily="18" charset="-127"/>
                   <a:ea typeface="한컴 윤고딕 230" panose="02020603020101020101" pitchFamily="18" charset="-127"/>
                 </a:rPr>
-                <a:t>도서검</a:t>
-              </a:r>
-              <a:r>
-                <a:rPr lang="ko-KR" altLang="en-US" sz="1600" b="1" dirty="0">
-                  <a:solidFill>
-                    <a:srgbClr val="464646"/>
-                  </a:solidFill>
-                  <a:latin typeface="한컴 윤고딕 230" panose="02020603020101020101" pitchFamily="18" charset="-127"/>
-                  <a:ea typeface="한컴 윤고딕 230" panose="02020603020101020101" pitchFamily="18" charset="-127"/>
-                </a:rPr>
-                <a:t>색</a:t>
+                <a:t>도서검색</a:t>
               </a:r>
             </a:p>
           </p:txBody>
@@ -5458,13 +5398,6 @@
                 </a:rPr>
                 <a:t>게시판 이용</a:t>
               </a:r>
-              <a:endParaRPr lang="ko-KR" altLang="en-US" sz="1600" b="1" dirty="0">
-                <a:solidFill>
-                  <a:srgbClr val="464646"/>
-                </a:solidFill>
-                <a:latin typeface="한컴 윤고딕 230" panose="02020603020101020101" pitchFamily="18" charset="-127"/>
-                <a:ea typeface="한컴 윤고딕 230" panose="02020603020101020101" pitchFamily="18" charset="-127"/>
-              </a:endParaRPr>
             </a:p>
           </p:txBody>
         </p:sp>
@@ -5577,13 +5510,6 @@
                 </a:rPr>
                 <a:t>도서 신청</a:t>
               </a:r>
-              <a:endParaRPr lang="ko-KR" altLang="en-US" sz="1600" b="1" dirty="0">
-                <a:solidFill>
-                  <a:srgbClr val="464646"/>
-                </a:solidFill>
-                <a:latin typeface="한컴 윤고딕 230" panose="02020603020101020101" pitchFamily="18" charset="-127"/>
-                <a:ea typeface="한컴 윤고딕 230" panose="02020603020101020101" pitchFamily="18" charset="-127"/>
-              </a:endParaRPr>
             </a:p>
           </p:txBody>
         </p:sp>
@@ -6000,13 +5926,6 @@
                 </a:rPr>
                 <a:t>통계현황</a:t>
               </a:r>
-              <a:endParaRPr lang="ko-KR" altLang="en-US" sz="1600" b="1" dirty="0">
-                <a:solidFill>
-                  <a:srgbClr val="464646"/>
-                </a:solidFill>
-                <a:latin typeface="한컴 윤고딕 230" panose="02020603020101020101" pitchFamily="18" charset="-127"/>
-                <a:ea typeface="한컴 윤고딕 230" panose="02020603020101020101" pitchFamily="18" charset="-127"/>
-              </a:endParaRPr>
             </a:p>
           </p:txBody>
         </p:sp>
@@ -6090,15 +6009,6 @@
               </a:rPr>
               <a:t>블랙회원</a:t>
             </a:r>
-            <a:endParaRPr lang="ko-KR" altLang="en-US" sz="1200" b="1" dirty="0">
-              <a:solidFill>
-                <a:schemeClr val="bg1">
-                  <a:lumMod val="50000"/>
-                </a:schemeClr>
-              </a:solidFill>
-              <a:latin typeface="다음_SemiBold" panose="02000700060000000000" pitchFamily="2" charset="-127"/>
-              <a:ea typeface="다음_SemiBold" panose="02000700060000000000" pitchFamily="2" charset="-127"/>
-            </a:endParaRPr>
           </a:p>
         </p:txBody>
       </p:sp>
@@ -6266,11 +6176,6 @@
               </a:rPr>
               <a:t>요구사항 분석</a:t>
             </a:r>
-            <a:endParaRPr lang="ko-KR" altLang="en-US" b="1" dirty="0">
-              <a:solidFill>
-                <a:srgbClr val="756B5F"/>
-              </a:solidFill>
-            </a:endParaRPr>
           </a:p>
         </p:txBody>
       </p:sp>
@@ -6306,10 +6211,6 @@
               </a:rPr>
               <a:t>이용자 권한</a:t>
             </a:r>
-            <a:endParaRPr lang="ko-KR" altLang="en-US" dirty="0">
-              <a:latin typeface="한컴 윤고딕 230" panose="02020603020101020101" pitchFamily="18" charset="-127"/>
-              <a:ea typeface="한컴 윤고딕 230" panose="02020603020101020101" pitchFamily="18" charset="-127"/>
-            </a:endParaRPr>
           </a:p>
         </p:txBody>
       </p:sp>
@@ -6352,15 +6253,6 @@
               </a:rPr>
               <a:t>용어정리</a:t>
             </a:r>
-            <a:endParaRPr lang="ko-KR" altLang="en-US" sz="1600" dirty="0">
-              <a:solidFill>
-                <a:schemeClr val="accent6">
-                  <a:lumMod val="50000"/>
-                </a:schemeClr>
-              </a:solidFill>
-              <a:latin typeface="한컴 윤고딕 230" panose="02020603020101020101" pitchFamily="18" charset="-127"/>
-              <a:ea typeface="한컴 윤고딕 230" panose="02020603020101020101" pitchFamily="18" charset="-127"/>
-            </a:endParaRPr>
           </a:p>
           <a:p>
             <a:pPr marL="285750" indent="-285750">
@@ -6404,19 +6296,7 @@
                 <a:latin typeface="한컴 윤고딕 230" panose="02020603020101020101" pitchFamily="18" charset="-127"/>
                 <a:ea typeface="한컴 윤고딕 230" panose="02020603020101020101" pitchFamily="18" charset="-127"/>
               </a:rPr>
-              <a:t>도서관 시스템을 이용하고자 하는 </a:t>
-            </a:r>
-            <a:r>
-              <a:rPr lang="ko-KR" altLang="en-US" sz="1600" dirty="0">
-                <a:solidFill>
-                  <a:schemeClr val="accent6">
-                    <a:lumMod val="50000"/>
-                  </a:schemeClr>
-                </a:solidFill>
-                <a:latin typeface="한컴 윤고딕 230" panose="02020603020101020101" pitchFamily="18" charset="-127"/>
-                <a:ea typeface="한컴 윤고딕 230" panose="02020603020101020101" pitchFamily="18" charset="-127"/>
-              </a:rPr>
-              <a:t>모든 사람들</a:t>
+              <a:t>도서관 시스템을 이용하고자 하는 모든 사람들</a:t>
             </a:r>
             <a:endParaRPr lang="en-US" altLang="ko-KR" sz="1600" dirty="0">
               <a:solidFill>
@@ -6470,31 +6350,7 @@
                 <a:latin typeface="한컴 윤고딕 230" panose="02020603020101020101" pitchFamily="18" charset="-127"/>
                 <a:ea typeface="한컴 윤고딕 230" panose="02020603020101020101" pitchFamily="18" charset="-127"/>
               </a:rPr>
-              <a:t>관리자 권한을 부여 받은 </a:t>
-            </a:r>
-            <a:r>
-              <a:rPr lang="ko-KR" altLang="en-US" sz="1600" dirty="0">
-                <a:solidFill>
-                  <a:schemeClr val="accent6">
-                    <a:lumMod val="50000"/>
-                  </a:schemeClr>
-                </a:solidFill>
-                <a:latin typeface="한컴 윤고딕 230" panose="02020603020101020101" pitchFamily="18" charset="-127"/>
-                <a:ea typeface="한컴 윤고딕 230" panose="02020603020101020101" pitchFamily="18" charset="-127"/>
-              </a:rPr>
-              <a:t>사</a:t>
-            </a:r>
-            <a:r>
-              <a:rPr lang="ko-KR" altLang="en-US" sz="1600" dirty="0">
-                <a:solidFill>
-                  <a:schemeClr val="accent6">
-                    <a:lumMod val="50000"/>
-                  </a:schemeClr>
-                </a:solidFill>
-                <a:latin typeface="한컴 윤고딕 230" panose="02020603020101020101" pitchFamily="18" charset="-127"/>
-                <a:ea typeface="한컴 윤고딕 230" panose="02020603020101020101" pitchFamily="18" charset="-127"/>
-              </a:rPr>
-              <a:t>서</a:t>
+              <a:t>관리자 권한을 부여 받은 사서</a:t>
             </a:r>
             <a:endParaRPr lang="en-US" altLang="ko-KR" sz="1600" dirty="0">
               <a:solidFill>
@@ -6692,19 +6548,7 @@
                 <a:latin typeface="한컴 윤고딕 230" panose="02020603020101020101" pitchFamily="18" charset="-127"/>
                 <a:ea typeface="한컴 윤고딕 230" panose="02020603020101020101" pitchFamily="18" charset="-127"/>
               </a:rPr>
-              <a:t>으로 </a:t>
-            </a:r>
-            <a:r>
-              <a:rPr lang="ko-KR" altLang="en-US" sz="1600" dirty="0">
-                <a:solidFill>
-                  <a:schemeClr val="accent6">
-                    <a:lumMod val="50000"/>
-                  </a:schemeClr>
-                </a:solidFill>
-                <a:latin typeface="한컴 윤고딕 230" panose="02020603020101020101" pitchFamily="18" charset="-127"/>
-                <a:ea typeface="한컴 윤고딕 230" panose="02020603020101020101" pitchFamily="18" charset="-127"/>
-              </a:rPr>
-              <a:t>구분된다</a:t>
+              <a:t>으로 구분된다</a:t>
             </a:r>
             <a:r>
               <a:rPr lang="en-US" altLang="ko-KR" sz="1600" dirty="0">
@@ -14317,11 +14161,6 @@
               </a:rPr>
               <a:t>순차 다이어그램</a:t>
             </a:r>
-            <a:endParaRPr lang="ko-KR" altLang="en-US" b="1" dirty="0">
-              <a:solidFill>
-                <a:srgbClr val="756B5F"/>
-              </a:solidFill>
-            </a:endParaRPr>
           </a:p>
         </p:txBody>
       </p:sp>
@@ -14796,13 +14635,8 @@
               <a:pPr algn="ctr"/>
               <a:r>
                 <a:rPr lang="ko-KR" altLang="en-US" sz="1000" b="1" dirty="0"/>
-                <a:t>도서관</a:t>
+                <a:t>도서관리</a:t>
               </a:r>
-              <a:r>
-                <a:rPr lang="ko-KR" altLang="en-US" sz="1000" b="1" dirty="0"/>
-                <a:t>리</a:t>
-              </a:r>
-              <a:endParaRPr lang="ko-KR" altLang="en-US" sz="1000" b="1" dirty="0"/>
             </a:p>
           </p:txBody>
         </p:sp>
@@ -15246,7 +15080,6 @@
                 <a:rPr lang="ko-KR" altLang="en-US" sz="1000" dirty="0"/>
                 <a:t>로그인</a:t>
               </a:r>
-              <a:endParaRPr lang="ko-KR" altLang="en-US" sz="1000" dirty="0"/>
             </a:p>
           </p:txBody>
         </p:sp>
@@ -15314,11 +15147,7 @@
               </a:r>
               <a:r>
                 <a:rPr lang="ko-KR" altLang="en-US" sz="1000" dirty="0"/>
-                <a:t>관리자승</a:t>
-              </a:r>
-              <a:r>
-                <a:rPr lang="ko-KR" altLang="en-US" sz="1000" dirty="0"/>
-                <a:t>인</a:t>
+                <a:t>관리자승인</a:t>
               </a:r>
             </a:p>
           </p:txBody>
@@ -15451,7 +15280,6 @@
                 <a:rPr lang="ko-KR" altLang="en-US" sz="1000" dirty="0"/>
                 <a:t>반납</a:t>
               </a:r>
-              <a:endParaRPr lang="ko-KR" altLang="en-US" sz="1000" dirty="0"/>
             </a:p>
           </p:txBody>
         </p:sp>
@@ -15479,11 +15307,7 @@
             <a:p>
               <a:r>
                 <a:rPr lang="en-US" altLang="ko-KR" sz="1000" dirty="0"/>
-                <a:t>4</a:t>
-              </a:r>
-              <a:r>
-                <a:rPr lang="en-US" altLang="ko-KR" sz="1000" dirty="0"/>
-                <a:t>. </a:t>
+                <a:t>4. </a:t>
               </a:r>
               <a:r>
                 <a:rPr lang="ko-KR" altLang="en-US" sz="1000" dirty="0"/>
@@ -15497,7 +15321,6 @@
                 <a:rPr lang="ko-KR" altLang="en-US" sz="1000" dirty="0"/>
                 <a:t>반납 승인 및 확인</a:t>
               </a:r>
-              <a:endParaRPr lang="ko-KR" altLang="en-US" sz="1000" dirty="0"/>
             </a:p>
           </p:txBody>
         </p:sp>
@@ -15659,11 +15482,7 @@
               </a:r>
               <a:r>
                 <a:rPr lang="en-US" altLang="ko-KR" sz="1000" dirty="0"/>
-                <a:t> </a:t>
-              </a:r>
-              <a:r>
-                <a:rPr lang="en-US" altLang="ko-KR" sz="1000" dirty="0"/>
-                <a:t>/ </a:t>
+                <a:t> / </a:t>
               </a:r>
               <a:r>
                 <a:rPr lang="ko-KR" altLang="en-US" sz="1000" dirty="0"/>
@@ -15685,7 +15504,6 @@
                 <a:rPr lang="ko-KR" altLang="en-US" sz="1000" dirty="0"/>
                 <a:t>삭제</a:t>
               </a:r>
-              <a:endParaRPr lang="ko-KR" altLang="en-US" sz="1000" dirty="0"/>
             </a:p>
           </p:txBody>
         </p:sp>
@@ -15719,7 +15537,6 @@
                 <a:rPr lang="ko-KR" altLang="en-US" sz="1000" dirty="0"/>
                 <a:t>공지사항 목록 확인</a:t>
               </a:r>
-              <a:endParaRPr lang="ko-KR" altLang="en-US" sz="1000" dirty="0"/>
             </a:p>
           </p:txBody>
         </p:sp>
@@ -16009,7 +15826,6 @@
                 <a:rPr lang="ko-KR" altLang="en-US" sz="1000" dirty="0"/>
                 <a:t> 다수 이용 순으로 조회 및 회원 레벨 조정</a:t>
               </a:r>
-              <a:endParaRPr lang="ko-KR" altLang="en-US" sz="1000" dirty="0"/>
             </a:p>
           </p:txBody>
         </p:sp>
@@ -16043,7 +15859,6 @@
                 <a:rPr lang="ko-KR" altLang="en-US" sz="1000" dirty="0"/>
                 <a:t>회원 목록 확인</a:t>
               </a:r>
-              <a:endParaRPr lang="ko-KR" altLang="en-US" sz="1000" dirty="0"/>
             </a:p>
           </p:txBody>
         </p:sp>
@@ -16211,7 +16026,6 @@
                 <a:rPr lang="ko-KR" altLang="en-US" sz="1000" dirty="0"/>
                 <a:t>우수회원에게 도서추천</a:t>
               </a:r>
-              <a:endParaRPr lang="ko-KR" altLang="en-US" sz="1000" dirty="0"/>
             </a:p>
           </p:txBody>
         </p:sp>
@@ -16245,7 +16059,6 @@
                 <a:rPr lang="ko-KR" altLang="en-US" sz="1000" dirty="0"/>
                 <a:t>통계 결과 확인</a:t>
               </a:r>
-              <a:endParaRPr lang="ko-KR" altLang="en-US" sz="1000" dirty="0"/>
             </a:p>
           </p:txBody>
         </p:sp>
@@ -16273,11 +16086,7 @@
             <a:p>
               <a:r>
                 <a:rPr lang="en-US" altLang="ko-KR" sz="900" dirty="0"/>
-                <a:t>7</a:t>
-              </a:r>
-              <a:r>
-                <a:rPr lang="en-US" altLang="ko-KR" sz="900" dirty="0"/>
-                <a:t>. </a:t>
+                <a:t>7. </a:t>
               </a:r>
               <a:r>
                 <a:rPr lang="ko-KR" altLang="en-US" sz="900" dirty="0"/>
@@ -16297,11 +16106,7 @@
               </a:r>
               <a:r>
                 <a:rPr lang="ko-KR" altLang="en-US" sz="900" dirty="0"/>
-                <a:t>삭</a:t>
-              </a:r>
-              <a:r>
-                <a:rPr lang="ko-KR" altLang="en-US" sz="900" dirty="0"/>
-                <a:t>제</a:t>
+                <a:t>삭제</a:t>
               </a:r>
             </a:p>
           </p:txBody>
@@ -16336,7 +16141,6 @@
                 <a:rPr lang="ko-KR" altLang="en-US" sz="900" dirty="0"/>
                 <a:t>도서 목록 확인</a:t>
               </a:r>
-              <a:endParaRPr lang="ko-KR" altLang="en-US" sz="900" dirty="0"/>
             </a:p>
           </p:txBody>
         </p:sp>
@@ -16440,11 +16244,6 @@
               </a:rPr>
               <a:t>클래스 다이어그램</a:t>
             </a:r>
-            <a:endParaRPr lang="ko-KR" altLang="en-US" b="1" dirty="0">
-              <a:solidFill>
-                <a:srgbClr val="756B5F"/>
-              </a:solidFill>
-            </a:endParaRPr>
           </a:p>
         </p:txBody>
       </p:sp>
@@ -16684,11 +16483,6 @@
               </a:rPr>
               <a:t>검색</a:t>
             </a:r>
-            <a:endParaRPr lang="ko-KR" altLang="en-US" b="1" dirty="0">
-              <a:solidFill>
-                <a:srgbClr val="756B5F"/>
-              </a:solidFill>
-            </a:endParaRPr>
           </a:p>
         </p:txBody>
       </p:sp>
@@ -16805,15 +16599,7 @@
                   <a:srgbClr val="756B5F"/>
                 </a:solidFill>
               </a:rPr>
-              <a:t>DFD(Data Flow Diagram) </a:t>
-            </a:r>
-            <a:r>
-              <a:rPr lang="en-US" altLang="ko-KR" b="1">
-                <a:solidFill>
-                  <a:srgbClr val="756B5F"/>
-                </a:solidFill>
-              </a:rPr>
-              <a:t>– </a:t>
+              <a:t>DFD(Data Flow Diagram) – </a:t>
             </a:r>
             <a:r>
               <a:rPr lang="ko-KR" altLang="en-US" b="1">
@@ -17072,11 +16858,6 @@
               </a:rPr>
               <a:t>회원 분할</a:t>
             </a:r>
-            <a:endParaRPr lang="ko-KR" altLang="en-US" dirty="0">
-              <a:solidFill>
-                <a:srgbClr val="FF0000"/>
-              </a:solidFill>
-            </a:endParaRPr>
           </a:p>
         </p:txBody>
       </p:sp>
@@ -17193,15 +16974,7 @@
                   <a:srgbClr val="756B5F"/>
                 </a:solidFill>
               </a:rPr>
-              <a:t>기능정의 및 </a:t>
-            </a:r>
-            <a:r>
-              <a:rPr lang="ko-KR" altLang="en-US" b="1" dirty="0">
-                <a:solidFill>
-                  <a:srgbClr val="756B5F"/>
-                </a:solidFill>
-              </a:rPr>
-              <a:t>설계 </a:t>
+              <a:t>기능정의 및 설계 </a:t>
             </a:r>
             <a:r>
               <a:rPr lang="en-US" altLang="ko-KR" b="1" dirty="0">
@@ -17352,15 +17125,7 @@
                   <a:srgbClr val="756B5F"/>
                 </a:solidFill>
               </a:rPr>
-              <a:t>기능정의 및 </a:t>
-            </a:r>
-            <a:r>
-              <a:rPr lang="ko-KR" altLang="en-US" b="1" dirty="0">
-                <a:solidFill>
-                  <a:srgbClr val="756B5F"/>
-                </a:solidFill>
-              </a:rPr>
-              <a:t>설계 </a:t>
+              <a:t>기능정의 및 설계 </a:t>
             </a:r>
             <a:r>
               <a:rPr lang="en-US" altLang="ko-KR" b="1" dirty="0">
@@ -17930,7 +17695,6 @@
               <a:rPr lang="en-US" altLang="ko-KR"/>
               <a:t>UI</a:t>
             </a:r>
-            <a:endParaRPr lang="en-US" altLang="ko-KR"/>
           </a:p>
         </p:txBody>
       </p:sp>
@@ -18009,11 +17773,7 @@
             </a:pPr>
             <a:r>
               <a:rPr lang="ko-KR" altLang="en-US" dirty="0"/>
-              <a:t>후</a:t>
-            </a:r>
-            <a:r>
-              <a:rPr lang="ko-KR" altLang="en-US" dirty="0"/>
-              <a:t>기</a:t>
+              <a:t>후기</a:t>
             </a:r>
             <a:endParaRPr lang="en-US" altLang="ko-KR" dirty="0"/>
           </a:p>
@@ -19058,15 +18818,7 @@
                   <a:srgbClr val="756B5F"/>
                 </a:solidFill>
               </a:rPr>
-              <a:t>핵심 코드 및 시연 화</a:t>
-            </a:r>
-            <a:r>
-              <a:rPr lang="ko-KR" altLang="en-US" b="1" dirty="0">
-                <a:solidFill>
-                  <a:srgbClr val="756B5F"/>
-                </a:solidFill>
-              </a:rPr>
-              <a:t>면</a:t>
+              <a:t>핵심 코드 및 시연 화면</a:t>
             </a:r>
           </a:p>
         </p:txBody>
@@ -19197,7 +18949,7 @@
         </p:nvSpPr>
         <p:spPr>
           <a:xfrm>
-            <a:off x="1847528" y="107340"/>
+            <a:off x="407368" y="116632"/>
             <a:ext cx="4464497" cy="369332"/>
           </a:xfrm>
           <a:prstGeom prst="rect">
@@ -19225,15 +18977,7 @@
                   <a:srgbClr val="756B5F"/>
                 </a:solidFill>
               </a:rPr>
-              <a:t>핵심 코드 및 시연 화</a:t>
-            </a:r>
-            <a:r>
-              <a:rPr lang="ko-KR" altLang="en-US" b="1" dirty="0">
-                <a:solidFill>
-                  <a:srgbClr val="756B5F"/>
-                </a:solidFill>
-              </a:rPr>
-              <a:t>면</a:t>
+              <a:t>핵심 코드 및 시연 화면</a:t>
             </a:r>
           </a:p>
         </p:txBody>
@@ -19330,11 +19074,6 @@
               </a:rPr>
               <a:t>차후 개발 내용</a:t>
             </a:r>
-            <a:endParaRPr lang="ko-KR" altLang="en-US" b="1" dirty="0">
-              <a:solidFill>
-                <a:srgbClr val="756B5F"/>
-              </a:solidFill>
-            </a:endParaRPr>
           </a:p>
         </p:txBody>
       </p:sp>
@@ -19437,11 +19176,6 @@
               </a:rPr>
               <a:t>후기</a:t>
             </a:r>
-            <a:endParaRPr lang="ko-KR" altLang="en-US" b="1" dirty="0">
-              <a:solidFill>
-                <a:srgbClr val="756B5F"/>
-              </a:solidFill>
-            </a:endParaRPr>
           </a:p>
         </p:txBody>
       </p:sp>
@@ -20302,11 +20036,6 @@
               </a:rPr>
               <a:t>주제 및 목적</a:t>
             </a:r>
-            <a:endParaRPr lang="ko-KR" altLang="en-US" b="1" dirty="0">
-              <a:solidFill>
-                <a:srgbClr val="756B5F"/>
-              </a:solidFill>
-            </a:endParaRPr>
           </a:p>
         </p:txBody>
       </p:sp>
@@ -20348,7 +20077,16 @@
                 </a:solidFill>
                 <a:latin typeface="+mn-ea"/>
               </a:rPr>
-              <a:t>본 </a:t>
+              <a:t>본 시스템은 도서관 웹 페이지와 도서관 관리 시스템을 통합하여 하나의 프로그램으로 이용 및 관리할 수 있는 </a:t>
+            </a:r>
+            <a:r>
+              <a:rPr lang="ko-KR" altLang="en-US" sz="2000" dirty="0" err="1">
+                <a:solidFill>
+                  <a:srgbClr val="464646"/>
+                </a:solidFill>
+                <a:latin typeface="+mn-ea"/>
+              </a:rPr>
+              <a:t>통합형</a:t>
             </a:r>
             <a:r>
               <a:rPr lang="ko-KR" altLang="en-US" sz="2000" dirty="0">
@@ -20357,43 +20095,7 @@
                 </a:solidFill>
                 <a:latin typeface="+mn-ea"/>
               </a:rPr>
-              <a:t>시스템은 도서관 웹 페이지와 도서관 관리 시스템을 통합하여 하나의 프로그램으로 이용 및 </a:t>
-            </a:r>
-            <a:r>
-              <a:rPr lang="ko-KR" altLang="en-US" sz="2000" dirty="0">
-                <a:solidFill>
-                  <a:srgbClr val="464646"/>
-                </a:solidFill>
-                <a:latin typeface="+mn-ea"/>
-              </a:rPr>
-              <a:t>관리할 수 있는 </a:t>
-            </a:r>
-            <a:r>
-              <a:rPr lang="ko-KR" altLang="en-US" sz="2000" dirty="0" err="1">
-                <a:solidFill>
-                  <a:srgbClr val="464646"/>
-                </a:solidFill>
-                <a:latin typeface="+mn-ea"/>
-              </a:rPr>
-              <a:t>통합형</a:t>
-            </a:r>
-            <a:r>
-              <a:rPr lang="ko-KR" altLang="en-US" sz="2000" dirty="0">
-                <a:solidFill>
-                  <a:srgbClr val="464646"/>
-                </a:solidFill>
-                <a:latin typeface="+mn-ea"/>
-              </a:rPr>
-              <a:t> </a:t>
-            </a:r>
-            <a:r>
-              <a:rPr lang="ko-KR" altLang="en-US" sz="2000" dirty="0">
-                <a:solidFill>
-                  <a:srgbClr val="464646"/>
-                </a:solidFill>
-                <a:latin typeface="+mn-ea"/>
-              </a:rPr>
-              <a:t>도서관 관리 시스템이다</a:t>
+              <a:t> 도서관 관리 시스템이다</a:t>
             </a:r>
             <a:r>
               <a:rPr lang="en-US" altLang="ko-KR" sz="2000" dirty="0">
@@ -20480,7 +20182,16 @@
                 </a:solidFill>
                 <a:latin typeface="+mn-ea"/>
               </a:rPr>
-              <a:t>모든 </a:t>
+              <a:t>모든 이용자는 등급에 따라 관리되며 최소 검색기능부터</a:t>
+            </a:r>
+            <a:r>
+              <a:rPr lang="en-US" altLang="ko-KR" sz="2000" dirty="0">
+                <a:solidFill>
+                  <a:srgbClr val="464646"/>
+                </a:solidFill>
+                <a:latin typeface="+mn-ea"/>
+              </a:rPr>
+              <a:t>, </a:t>
             </a:r>
             <a:r>
               <a:rPr lang="ko-KR" altLang="en-US" sz="2000" dirty="0">
@@ -20489,7 +20200,16 @@
                 </a:solidFill>
                 <a:latin typeface="+mn-ea"/>
               </a:rPr>
-              <a:t>이용자는 등</a:t>
+              <a:t>최대 도서 대출</a:t>
+            </a:r>
+            <a:r>
+              <a:rPr lang="en-US" altLang="ko-KR" sz="2000" dirty="0">
+                <a:solidFill>
+                  <a:srgbClr val="464646"/>
+                </a:solidFill>
+                <a:latin typeface="+mn-ea"/>
+              </a:rPr>
+              <a:t>, </a:t>
             </a:r>
             <a:r>
               <a:rPr lang="ko-KR" altLang="en-US" sz="2000" dirty="0">
@@ -20498,7 +20218,16 @@
                 </a:solidFill>
                 <a:latin typeface="+mn-ea"/>
               </a:rPr>
-              <a:t>급에 </a:t>
+              <a:t>도서 및 자리 예약</a:t>
+            </a:r>
+            <a:r>
+              <a:rPr lang="en-US" altLang="ko-KR" sz="2000" dirty="0">
+                <a:solidFill>
+                  <a:srgbClr val="464646"/>
+                </a:solidFill>
+                <a:latin typeface="+mn-ea"/>
+              </a:rPr>
+              <a:t>, </a:t>
             </a:r>
             <a:r>
               <a:rPr lang="ko-KR" altLang="en-US" sz="2000" dirty="0">
@@ -20507,7 +20236,7 @@
                 </a:solidFill>
                 <a:latin typeface="+mn-ea"/>
               </a:rPr>
-              <a:t>따라 관리되며 최소 검색기능부터</a:t>
+              <a:t>도서 신청</a:t>
             </a:r>
             <a:r>
               <a:rPr lang="en-US" altLang="ko-KR" sz="2000" dirty="0">
@@ -20525,7 +20254,16 @@
                 </a:solidFill>
                 <a:latin typeface="+mn-ea"/>
               </a:rPr>
-              <a:t>최대 도서 </a:t>
+              <a:t>회원게시판 이용</a:t>
+            </a:r>
+            <a:r>
+              <a:rPr lang="en-US" altLang="ko-KR" sz="2000" dirty="0">
+                <a:solidFill>
+                  <a:srgbClr val="464646"/>
+                </a:solidFill>
+                <a:latin typeface="+mn-ea"/>
+              </a:rPr>
+              <a:t>, </a:t>
             </a:r>
             <a:r>
               <a:rPr lang="ko-KR" altLang="en-US" sz="2000" dirty="0">
@@ -20534,131 +20272,8 @@
                 </a:solidFill>
                 <a:latin typeface="+mn-ea"/>
               </a:rPr>
-              <a:t>대출</a:t>
-            </a:r>
-            <a:r>
-              <a:rPr lang="en-US" altLang="ko-KR" sz="2000" dirty="0">
-                <a:solidFill>
-                  <a:srgbClr val="464646"/>
-                </a:solidFill>
-                <a:latin typeface="+mn-ea"/>
-              </a:rPr>
-              <a:t>, </a:t>
-            </a:r>
-            <a:r>
-              <a:rPr lang="ko-KR" altLang="en-US" sz="2000" dirty="0">
-                <a:solidFill>
-                  <a:srgbClr val="464646"/>
-                </a:solidFill>
-                <a:latin typeface="+mn-ea"/>
-              </a:rPr>
-              <a:t>도서 및 자리 예약</a:t>
-            </a:r>
-            <a:r>
-              <a:rPr lang="en-US" altLang="ko-KR" sz="2000" dirty="0">
-                <a:solidFill>
-                  <a:srgbClr val="464646"/>
-                </a:solidFill>
-                <a:latin typeface="+mn-ea"/>
-              </a:rPr>
-              <a:t>, </a:t>
-            </a:r>
-            <a:r>
-              <a:rPr lang="ko-KR" altLang="en-US" sz="2000" dirty="0">
-                <a:solidFill>
-                  <a:srgbClr val="464646"/>
-                </a:solidFill>
-                <a:latin typeface="+mn-ea"/>
-              </a:rPr>
-              <a:t>도서 </a:t>
-            </a:r>
-            <a:r>
-              <a:rPr lang="ko-KR" altLang="en-US" sz="2000" dirty="0">
-                <a:solidFill>
-                  <a:srgbClr val="464646"/>
-                </a:solidFill>
-                <a:latin typeface="+mn-ea"/>
-              </a:rPr>
-              <a:t>신청</a:t>
-            </a:r>
-            <a:r>
-              <a:rPr lang="en-US" altLang="ko-KR" sz="2000" dirty="0">
-                <a:solidFill>
-                  <a:srgbClr val="464646"/>
-                </a:solidFill>
-                <a:latin typeface="+mn-ea"/>
-              </a:rPr>
-              <a:t>, </a:t>
-            </a:r>
-            <a:r>
-              <a:rPr lang="ko-KR" altLang="en-US" sz="2000" dirty="0">
-                <a:solidFill>
-                  <a:srgbClr val="464646"/>
-                </a:solidFill>
-                <a:latin typeface="+mn-ea"/>
-              </a:rPr>
-              <a:t>회</a:t>
-            </a:r>
-            <a:r>
-              <a:rPr lang="ko-KR" altLang="en-US" sz="2000" dirty="0">
-                <a:solidFill>
-                  <a:srgbClr val="464646"/>
-                </a:solidFill>
-                <a:latin typeface="+mn-ea"/>
-              </a:rPr>
-              <a:t>원</a:t>
-            </a:r>
-            <a:r>
-              <a:rPr lang="ko-KR" altLang="en-US" sz="2000" dirty="0">
-                <a:solidFill>
-                  <a:srgbClr val="464646"/>
-                </a:solidFill>
-                <a:latin typeface="+mn-ea"/>
-              </a:rPr>
-              <a:t>게시판 이용</a:t>
-            </a:r>
-            <a:r>
-              <a:rPr lang="en-US" altLang="ko-KR" sz="2000" dirty="0">
-                <a:solidFill>
-                  <a:srgbClr val="464646"/>
-                </a:solidFill>
-                <a:latin typeface="+mn-ea"/>
-              </a:rPr>
-              <a:t>, </a:t>
-            </a:r>
-            <a:r>
-              <a:rPr lang="ko-KR" altLang="en-US" sz="2000" dirty="0">
-                <a:solidFill>
-                  <a:srgbClr val="464646"/>
-                </a:solidFill>
-                <a:latin typeface="+mn-ea"/>
-              </a:rPr>
-              <a:t>도서추천하기 </a:t>
-            </a:r>
-            <a:r>
-              <a:rPr lang="ko-KR" altLang="en-US" sz="2000" dirty="0">
-                <a:solidFill>
-                  <a:srgbClr val="464646"/>
-                </a:solidFill>
-                <a:latin typeface="+mn-ea"/>
-              </a:rPr>
-              <a:t>등의 기능을 </a:t>
-            </a:r>
-            <a:r>
-              <a:rPr lang="ko-KR" altLang="en-US" sz="2000" dirty="0">
-                <a:solidFill>
-                  <a:srgbClr val="464646"/>
-                </a:solidFill>
-                <a:latin typeface="+mn-ea"/>
-              </a:rPr>
-              <a:t>이용할 수 있다</a:t>
-            </a:r>
-            <a:endParaRPr lang="ko-KR" altLang="en-US" sz="2000" dirty="0">
-              <a:solidFill>
-                <a:srgbClr val="464646"/>
-              </a:solidFill>
-              <a:latin typeface="+mn-ea"/>
-            </a:endParaRPr>
+              <a:t>도서추천하기 등의 기능을 이용할 수 있다</a:t>
+            </a:r>
           </a:p>
           <a:p>
             <a:pPr marL="285750" indent="-285750">
@@ -20693,7 +20308,16 @@
                 </a:solidFill>
                 <a:latin typeface="+mn-ea"/>
               </a:rPr>
-              <a:t>최고 </a:t>
+              <a:t>최고 관리자를 기본으로 두고</a:t>
+            </a:r>
+            <a:r>
+              <a:rPr lang="en-US" altLang="ko-KR" sz="2000" dirty="0">
+                <a:solidFill>
+                  <a:srgbClr val="464646"/>
+                </a:solidFill>
+                <a:latin typeface="+mn-ea"/>
+              </a:rPr>
+              <a:t>, </a:t>
             </a:r>
             <a:r>
               <a:rPr lang="ko-KR" altLang="en-US" sz="2000" dirty="0">
@@ -20702,43 +20326,7 @@
                 </a:solidFill>
                 <a:latin typeface="+mn-ea"/>
               </a:rPr>
-              <a:t>관리자를 기본으로 두고</a:t>
-            </a:r>
-            <a:r>
-              <a:rPr lang="en-US" altLang="ko-KR" sz="2000" dirty="0">
-                <a:solidFill>
-                  <a:srgbClr val="464646"/>
-                </a:solidFill>
-                <a:latin typeface="+mn-ea"/>
-              </a:rPr>
-              <a:t>, </a:t>
-            </a:r>
-            <a:r>
-              <a:rPr lang="ko-KR" altLang="en-US" sz="2000" dirty="0">
-                <a:solidFill>
-                  <a:srgbClr val="464646"/>
-                </a:solidFill>
-                <a:latin typeface="+mn-ea"/>
-              </a:rPr>
-              <a:t>최고 관리자를 통해서 관리자 </a:t>
-            </a:r>
-            <a:r>
-              <a:rPr lang="ko-KR" altLang="en-US" sz="2000" dirty="0">
-                <a:solidFill>
-                  <a:srgbClr val="464646"/>
-                </a:solidFill>
-                <a:latin typeface="+mn-ea"/>
-              </a:rPr>
-              <a:t>계정 </a:t>
-            </a:r>
-            <a:r>
-              <a:rPr lang="ko-KR" altLang="en-US" sz="2000" dirty="0">
-                <a:solidFill>
-                  <a:srgbClr val="464646"/>
-                </a:solidFill>
-                <a:latin typeface="+mn-ea"/>
-              </a:rPr>
-              <a:t>등록</a:t>
+              <a:t>최고 관리자를 통해서 관리자 계정 등록</a:t>
             </a:r>
             <a:r>
               <a:rPr lang="en-US" altLang="ko-KR" sz="2000" dirty="0">
@@ -20780,7 +20368,16 @@
                 </a:solidFill>
                 <a:latin typeface="+mn-ea"/>
               </a:rPr>
-              <a:t>관리자는 회</a:t>
+              <a:t>관리자는 회원관리</a:t>
+            </a:r>
+            <a:r>
+              <a:rPr lang="en-US" altLang="ko-KR" sz="2000" dirty="0">
+                <a:solidFill>
+                  <a:srgbClr val="464646"/>
+                </a:solidFill>
+                <a:latin typeface="+mn-ea"/>
+              </a:rPr>
+              <a:t>, </a:t>
             </a:r>
             <a:r>
               <a:rPr lang="ko-KR" altLang="en-US" sz="2000" dirty="0">
@@ -20789,7 +20386,16 @@
                 </a:solidFill>
                 <a:latin typeface="+mn-ea"/>
               </a:rPr>
-              <a:t>원</a:t>
+              <a:t>도서등록 및 삭제 등의 관리</a:t>
+            </a:r>
+            <a:r>
+              <a:rPr lang="en-US" altLang="ko-KR" sz="2000" dirty="0">
+                <a:solidFill>
+                  <a:srgbClr val="464646"/>
+                </a:solidFill>
+                <a:latin typeface="+mn-ea"/>
+              </a:rPr>
+              <a:t>, </a:t>
             </a:r>
             <a:r>
               <a:rPr lang="ko-KR" altLang="en-US" sz="2000" dirty="0">
@@ -20798,7 +20404,7 @@
                 </a:solidFill>
                 <a:latin typeface="+mn-ea"/>
               </a:rPr>
-              <a:t>관리</a:t>
+              <a:t>공지사항 및 회원게시판 관리 등의 기능을 이용할 수 있다</a:t>
             </a:r>
             <a:r>
               <a:rPr lang="en-US" altLang="ko-KR" sz="2000" dirty="0">
@@ -20807,68 +20413,8 @@
                 </a:solidFill>
                 <a:latin typeface="+mn-ea"/>
               </a:rPr>
-              <a:t>, </a:t>
-            </a:r>
-            <a:r>
-              <a:rPr lang="ko-KR" altLang="en-US" sz="2000" dirty="0">
-                <a:solidFill>
-                  <a:srgbClr val="464646"/>
-                </a:solidFill>
-                <a:latin typeface="+mn-ea"/>
-              </a:rPr>
-              <a:t>도서등록 및 삭제 등의 관리</a:t>
-            </a:r>
-            <a:r>
-              <a:rPr lang="en-US" altLang="ko-KR" sz="2000" dirty="0">
-                <a:solidFill>
-                  <a:srgbClr val="464646"/>
-                </a:solidFill>
-                <a:latin typeface="+mn-ea"/>
-              </a:rPr>
-              <a:t>, </a:t>
-            </a:r>
-            <a:r>
-              <a:rPr lang="ko-KR" altLang="en-US" sz="2000" dirty="0">
-                <a:solidFill>
-                  <a:srgbClr val="464646"/>
-                </a:solidFill>
-                <a:latin typeface="+mn-ea"/>
-              </a:rPr>
-              <a:t>공지사항 및 회원게시판 관리 </a:t>
-            </a:r>
-            <a:r>
-              <a:rPr lang="ko-KR" altLang="en-US" sz="2000" dirty="0">
-                <a:solidFill>
-                  <a:srgbClr val="464646"/>
-                </a:solidFill>
-                <a:latin typeface="+mn-ea"/>
-              </a:rPr>
-              <a:t>등의 기능을 </a:t>
-            </a:r>
-            <a:r>
-              <a:rPr lang="ko-KR" altLang="en-US" sz="2000" dirty="0">
-                <a:solidFill>
-                  <a:srgbClr val="464646"/>
-                </a:solidFill>
-                <a:latin typeface="+mn-ea"/>
-              </a:rPr>
-              <a:t>이용할 수 있다</a:t>
-            </a:r>
-            <a:r>
-              <a:rPr lang="en-US" altLang="ko-KR" sz="2000" dirty="0">
-                <a:solidFill>
-                  <a:srgbClr val="464646"/>
-                </a:solidFill>
-                <a:latin typeface="+mn-ea"/>
-              </a:rPr>
               <a:t>.</a:t>
             </a:r>
-            <a:endParaRPr lang="en-US" altLang="ko-KR" sz="2000" dirty="0">
-              <a:solidFill>
-                <a:srgbClr val="464646"/>
-              </a:solidFill>
-              <a:latin typeface="+mn-ea"/>
-            </a:endParaRPr>
           </a:p>
           <a:p>
             <a:pPr>
@@ -21034,11 +20580,6 @@
               </a:rPr>
               <a:t>주제 및 목적</a:t>
             </a:r>
-            <a:endParaRPr lang="ko-KR" altLang="en-US" b="1" dirty="0">
-              <a:solidFill>
-                <a:srgbClr val="756B5F"/>
-              </a:solidFill>
-            </a:endParaRPr>
           </a:p>
         </p:txBody>
       </p:sp>
@@ -21651,12 +21192,6 @@
                 </a:rPr>
                 <a:t>OS</a:t>
               </a:r>
-              <a:endParaRPr lang="en-US" altLang="ko-KR" sz="1400" b="1" dirty="0">
-                <a:solidFill>
-                  <a:schemeClr val="bg1"/>
-                </a:solidFill>
-                <a:latin typeface="+mn-ea"/>
-              </a:endParaRPr>
             </a:p>
           </p:txBody>
         </p:sp>
@@ -21805,23 +21340,8 @@
                   </a:solidFill>
                   <a:latin typeface="+mn-ea"/>
                 </a:rPr>
-                <a:t>Windows </a:t>
+                <a:t>Windows 10 Home</a:t>
               </a:r>
-              <a:r>
-                <a:rPr lang="en-US" altLang="ko-KR" sz="1200" dirty="0">
-                  <a:solidFill>
-                    <a:srgbClr val="3F3F48"/>
-                  </a:solidFill>
-                  <a:latin typeface="+mn-ea"/>
-                </a:rPr>
-                <a:t>10 Home</a:t>
-              </a:r>
-              <a:endParaRPr lang="en-US" altLang="ko-KR" sz="1200" dirty="0">
-                <a:solidFill>
-                  <a:srgbClr val="3F3F48"/>
-                </a:solidFill>
-                <a:latin typeface="+mn-ea"/>
-              </a:endParaRPr>
             </a:p>
           </p:txBody>
         </p:sp>
@@ -21988,12 +21508,6 @@
                 </a:rPr>
                 <a:t>WAS</a:t>
               </a:r>
-              <a:endParaRPr lang="en-US" altLang="ko-KR" sz="1400" b="1" dirty="0">
-                <a:solidFill>
-                  <a:schemeClr val="bg1"/>
-                </a:solidFill>
-                <a:latin typeface="+mn-ea"/>
-              </a:endParaRPr>
             </a:p>
           </p:txBody>
         </p:sp>
@@ -22142,23 +21656,8 @@
                   </a:solidFill>
                   <a:latin typeface="+mn-ea"/>
                 </a:rPr>
-                <a:t>Apache Tomcat </a:t>
+                <a:t>Apache Tomcat 9.0</a:t>
               </a:r>
-              <a:r>
-                <a:rPr lang="en-US" altLang="ko-KR" sz="1200" dirty="0">
-                  <a:solidFill>
-                    <a:srgbClr val="3F3F48"/>
-                  </a:solidFill>
-                  <a:latin typeface="+mn-ea"/>
-                </a:rPr>
-                <a:t>9.0</a:t>
-              </a:r>
-              <a:endParaRPr lang="en-US" altLang="ko-KR" sz="1200" dirty="0">
-                <a:solidFill>
-                  <a:srgbClr val="3F3F48"/>
-                </a:solidFill>
-                <a:latin typeface="+mn-ea"/>
-              </a:endParaRPr>
             </a:p>
           </p:txBody>
         </p:sp>
@@ -22325,12 +21824,6 @@
                 </a:rPr>
                 <a:t>DBMS</a:t>
               </a:r>
-              <a:endParaRPr lang="en-US" altLang="ko-KR" sz="1400" b="1" dirty="0">
-                <a:solidFill>
-                  <a:schemeClr val="bg1"/>
-                </a:solidFill>
-                <a:latin typeface="+mn-ea"/>
-              </a:endParaRPr>
             </a:p>
           </p:txBody>
         </p:sp>
@@ -22479,23 +21972,8 @@
                   </a:solidFill>
                   <a:latin typeface="+mn-ea"/>
                 </a:rPr>
-                <a:t>Oracle XE </a:t>
+                <a:t>Oracle XE 11g</a:t>
               </a:r>
-              <a:r>
-                <a:rPr lang="en-US" altLang="ko-KR" sz="1200" dirty="0">
-                  <a:solidFill>
-                    <a:srgbClr val="3F3F48"/>
-                  </a:solidFill>
-                  <a:latin typeface="+mn-ea"/>
-                </a:rPr>
-                <a:t>11g</a:t>
-              </a:r>
-              <a:endParaRPr lang="en-US" altLang="ko-KR" sz="1200" dirty="0">
-                <a:solidFill>
-                  <a:srgbClr val="3F3F48"/>
-                </a:solidFill>
-                <a:latin typeface="+mn-ea"/>
-              </a:endParaRPr>
             </a:p>
           </p:txBody>
         </p:sp>
@@ -22810,23 +22288,8 @@
                   </a:solidFill>
                   <a:latin typeface="+mn-ea"/>
                 </a:rPr>
-                <a:t>Java </a:t>
+                <a:t>Java Platform 8, JSP &amp; Servlet </a:t>
               </a:r>
-              <a:r>
-                <a:rPr lang="en-US" altLang="ko-KR" sz="1200" dirty="0">
-                  <a:solidFill>
-                    <a:srgbClr val="3F3F48"/>
-                  </a:solidFill>
-                  <a:latin typeface="+mn-ea"/>
-                </a:rPr>
-                <a:t>Platform 8, JSP &amp; Servlet </a:t>
-              </a:r>
-              <a:endParaRPr lang="en-US" altLang="ko-KR" sz="1200" dirty="0">
-                <a:solidFill>
-                  <a:srgbClr val="3F3F48"/>
-                </a:solidFill>
-                <a:latin typeface="+mn-ea"/>
-              </a:endParaRPr>
             </a:p>
           </p:txBody>
         </p:sp>
@@ -22993,12 +22456,6 @@
                 </a:rPr>
                 <a:t>WEB</a:t>
               </a:r>
-              <a:endParaRPr lang="en-US" altLang="ko-KR" sz="1400" b="1" spc="-100" dirty="0">
-                <a:solidFill>
-                  <a:schemeClr val="bg1"/>
-                </a:solidFill>
-                <a:latin typeface="+mn-ea"/>
-              </a:endParaRPr>
             </a:p>
           </p:txBody>
         </p:sp>
@@ -23149,12 +22606,6 @@
                 </a:rPr>
                 <a:t>HTML5, CSS/CSS3, JavaScript, jQuery</a:t>
               </a:r>
-              <a:endParaRPr lang="en-US" altLang="ko-KR" sz="1200" dirty="0">
-                <a:solidFill>
-                  <a:srgbClr val="3F3F48"/>
-                </a:solidFill>
-                <a:latin typeface="+mn-ea"/>
-              </a:endParaRPr>
             </a:p>
           </p:txBody>
         </p:sp>
@@ -23321,12 +22772,6 @@
                 </a:rPr>
                 <a:t>Framework</a:t>
               </a:r>
-              <a:endParaRPr lang="en-US" altLang="ko-KR" sz="1400" b="1" spc="-100" dirty="0">
-                <a:solidFill>
-                  <a:schemeClr val="bg1"/>
-                </a:solidFill>
-                <a:latin typeface="+mn-ea"/>
-              </a:endParaRPr>
             </a:p>
           </p:txBody>
         </p:sp>
@@ -23504,12 +22949,6 @@
                 </a:rPr>
                 <a:t> framework</a:t>
               </a:r>
-              <a:endParaRPr lang="en-US" altLang="ko-KR" sz="1200" dirty="0">
-                <a:solidFill>
-                  <a:srgbClr val="3F3F48"/>
-                </a:solidFill>
-                <a:latin typeface="+mn-ea"/>
-              </a:endParaRPr>
             </a:p>
           </p:txBody>
         </p:sp>
@@ -23690,7 +23129,70 @@
                   </a:solidFill>
                   <a:latin typeface="+mn-ea"/>
                 </a:rPr>
-                <a:t>jquery-ui-1.11.4,   jquery-easyui-1.4.5,</a:t>
+                <a:t>jquery-ui-1.11.4,   </a:t>
+              </a:r>
+              <a:r>
+                <a:rPr lang="en-US" altLang="ko-KR" sz="1200">
+                  <a:solidFill>
+                    <a:srgbClr val="3F3F48"/>
+                  </a:solidFill>
+                  <a:latin typeface="+mn-ea"/>
+                </a:rPr>
+                <a:t>jquery-easyui-1.4.5</a:t>
+              </a:r>
+              <a:r>
+                <a:rPr lang="en-US" altLang="ko-KR" sz="1200" smtClean="0">
+                  <a:solidFill>
+                    <a:srgbClr val="3F3F48"/>
+                  </a:solidFill>
+                  <a:latin typeface="+mn-ea"/>
+                </a:rPr>
+                <a:t>, ckEditor, </a:t>
+              </a:r>
+              <a:r>
+                <a:rPr lang="ko-KR" altLang="en-US" sz="1200" smtClean="0">
+                  <a:solidFill>
+                    <a:srgbClr val="3F3F48"/>
+                  </a:solidFill>
+                  <a:latin typeface="+mn-ea"/>
+                </a:rPr>
+                <a:t>본인이</a:t>
+              </a:r>
+              <a:r>
+                <a:rPr lang="en-US" altLang="ko-KR" sz="1200" smtClean="0">
+                  <a:solidFill>
+                    <a:srgbClr val="3F3F48"/>
+                  </a:solidFill>
+                  <a:latin typeface="+mn-ea"/>
+                </a:rPr>
+                <a:t> </a:t>
+              </a:r>
+              <a:r>
+                <a:rPr lang="ko-KR" altLang="en-US" sz="1200" smtClean="0">
+                  <a:solidFill>
+                    <a:srgbClr val="3F3F48"/>
+                  </a:solidFill>
+                  <a:latin typeface="+mn-ea"/>
+                </a:rPr>
+                <a:t>사용한 </a:t>
+              </a:r>
+              <a:r>
+                <a:rPr lang="en-US" altLang="ko-KR" sz="1200" smtClean="0">
+                  <a:solidFill>
+                    <a:srgbClr val="3F3F48"/>
+                  </a:solidFill>
+                  <a:latin typeface="+mn-ea"/>
+                </a:rPr>
+                <a:t>api </a:t>
+              </a:r>
+              <a:r>
+                <a:rPr lang="ko-KR" altLang="en-US" sz="1200" smtClean="0">
+                  <a:solidFill>
+                    <a:srgbClr val="3F3F48"/>
+                  </a:solidFill>
+                  <a:latin typeface="+mn-ea"/>
+                </a:rPr>
+                <a:t>모두 기재</a:t>
               </a:r>
               <a:endParaRPr lang="en-US" altLang="ko-KR" sz="1200" dirty="0">
                 <a:solidFill>
@@ -23858,12 +23360,6 @@
                 </a:rPr>
                 <a:t>Source</a:t>
               </a:r>
-              <a:endParaRPr lang="en-US" altLang="ko-KR" sz="1400" b="1" spc="-100" dirty="0">
-                <a:solidFill>
-                  <a:schemeClr val="bg1"/>
-                </a:solidFill>
-                <a:latin typeface="+mn-ea"/>
-              </a:endParaRPr>
             </a:p>
           </p:txBody>
         </p:sp>
@@ -24030,12 +23526,6 @@
                 </a:rPr>
                 <a:t>Tool</a:t>
               </a:r>
-              <a:endParaRPr lang="en-US" altLang="ko-KR" sz="1400" b="1" spc="-100" dirty="0">
-                <a:solidFill>
-                  <a:schemeClr val="bg1"/>
-                </a:solidFill>
-                <a:latin typeface="+mn-ea"/>
-              </a:endParaRPr>
             </a:p>
           </p:txBody>
         </p:sp>
@@ -24211,32 +23701,8 @@
                   </a:solidFill>
                   <a:latin typeface="+mn-ea"/>
                 </a:rPr>
-                <a:t> (E-R </a:t>
+                <a:t> (E-R Modeling Tool)</a:t>
               </a:r>
-              <a:r>
-                <a:rPr lang="en-US" altLang="ko-KR" sz="1200" dirty="0">
-                  <a:solidFill>
-                    <a:srgbClr val="3F3F48"/>
-                  </a:solidFill>
-                  <a:latin typeface="+mn-ea"/>
-                </a:rPr>
-                <a:t>Modeling Tool</a:t>
-              </a:r>
-              <a:r>
-                <a:rPr lang="en-US" altLang="ko-KR" sz="1200" dirty="0">
-                  <a:solidFill>
-                    <a:srgbClr val="3F3F48"/>
-                  </a:solidFill>
-                  <a:latin typeface="+mn-ea"/>
-                </a:rPr>
-                <a:t>)</a:t>
-              </a:r>
-              <a:endParaRPr lang="en-US" altLang="ko-KR" sz="1200" dirty="0">
-                <a:solidFill>
-                  <a:srgbClr val="3F3F48"/>
-                </a:solidFill>
-                <a:latin typeface="+mn-ea"/>
-              </a:endParaRPr>
             </a:p>
           </p:txBody>
         </p:sp>
@@ -24249,7 +23715,7 @@
         </p:nvSpPr>
         <p:spPr>
           <a:xfrm>
-            <a:off x="3397895" y="153507"/>
+            <a:off x="1822624" y="132349"/>
             <a:ext cx="2160240" cy="276999"/>
           </a:xfrm>
           <a:prstGeom prst="rect">
@@ -24310,7 +23776,7 @@
         </p:nvSpPr>
         <p:spPr>
           <a:xfrm>
-            <a:off x="1847528" y="107340"/>
+            <a:off x="479376" y="76686"/>
             <a:ext cx="2232248" cy="369332"/>
           </a:xfrm>
           <a:prstGeom prst="rect">
@@ -24340,11 +23806,6 @@
               </a:rPr>
               <a:t>개발환경</a:t>
             </a:r>
-            <a:endParaRPr lang="ko-KR" altLang="en-US" b="1" dirty="0">
-              <a:solidFill>
-                <a:srgbClr val="756B5F"/>
-              </a:solidFill>
-            </a:endParaRPr>
           </a:p>
         </p:txBody>
       </p:sp>
@@ -24445,15 +23906,7 @@
                   <a:srgbClr val="756B5F"/>
                 </a:solidFill>
               </a:rPr>
-              <a:t>작업분할구조</a:t>
-            </a:r>
-            <a:r>
-              <a:rPr lang="ko-KR" altLang="en-US" b="1" dirty="0">
-                <a:solidFill>
-                  <a:srgbClr val="756B5F"/>
-                </a:solidFill>
-              </a:rPr>
-              <a:t>도</a:t>
+              <a:t>작업분할구조도</a:t>
             </a:r>
           </a:p>
         </p:txBody>
@@ -24620,11 +24073,7 @@
             <a:pPr algn="ctr"/>
             <a:r>
               <a:rPr lang="ko-KR" altLang="en-US" sz="1000" b="1" dirty="0"/>
-              <a:t>사</a:t>
-            </a:r>
-            <a:r>
-              <a:rPr lang="ko-KR" altLang="en-US" sz="1000" b="1" dirty="0"/>
-              <a:t>용자</a:t>
+              <a:t>사용자</a:t>
             </a:r>
           </a:p>
         </p:txBody>
@@ -25908,21 +25357,8 @@
                   <a:schemeClr val="tx1"/>
                 </a:solidFill>
               </a:rPr>
-              <a:t>신청작</a:t>
-            </a:r>
-            <a:r>
-              <a:rPr lang="ko-KR" altLang="en-US" sz="1000" b="1" dirty="0">
-                <a:solidFill>
-                  <a:schemeClr val="tx1"/>
-                </a:solidFill>
-              </a:rPr>
-              <a:t>성</a:t>
-            </a:r>
-            <a:endParaRPr lang="ko-KR" altLang="en-US" sz="1000" b="1" dirty="0">
-              <a:solidFill>
-                <a:schemeClr val="tx1"/>
-              </a:solidFill>
-            </a:endParaRPr>
+              <a:t>신청작성</a:t>
+            </a:r>
           </a:p>
         </p:txBody>
       </p:sp>
@@ -25981,23 +25417,7 @@
                   <a:schemeClr val="tx1"/>
                 </a:solidFill>
               </a:rPr>
-              <a:t>신</a:t>
-            </a:r>
-            <a:r>
-              <a:rPr lang="ko-KR" altLang="en-US" sz="1000" b="1" dirty="0">
-                <a:solidFill>
-                  <a:schemeClr val="tx1"/>
-                </a:solidFill>
-              </a:rPr>
-              <a:t>청</a:t>
-            </a:r>
-            <a:r>
-              <a:rPr lang="ko-KR" altLang="en-US" sz="1000" b="1" dirty="0">
-                <a:solidFill>
-                  <a:schemeClr val="tx1"/>
-                </a:solidFill>
-              </a:rPr>
-              <a:t>보기</a:t>
+              <a:t>신청보기</a:t>
             </a:r>
           </a:p>
         </p:txBody>
@@ -26057,23 +25477,7 @@
                   <a:schemeClr val="tx1"/>
                 </a:solidFill>
               </a:rPr>
-              <a:t>신</a:t>
-            </a:r>
-            <a:r>
-              <a:rPr lang="ko-KR" altLang="en-US" sz="1000" b="1" dirty="0">
-                <a:solidFill>
-                  <a:schemeClr val="tx1"/>
-                </a:solidFill>
-              </a:rPr>
-              <a:t>청</a:t>
-            </a:r>
-            <a:r>
-              <a:rPr lang="ko-KR" altLang="en-US" sz="1000" b="1" dirty="0">
-                <a:solidFill>
-                  <a:schemeClr val="tx1"/>
-                </a:solidFill>
-              </a:rPr>
-              <a:t>수정</a:t>
+              <a:t>신청수정</a:t>
             </a:r>
           </a:p>
         </p:txBody>
@@ -26133,23 +25537,7 @@
                   <a:schemeClr val="tx1"/>
                 </a:solidFill>
               </a:rPr>
-              <a:t>신</a:t>
-            </a:r>
-            <a:r>
-              <a:rPr lang="ko-KR" altLang="en-US" sz="1000" b="1" dirty="0">
-                <a:solidFill>
-                  <a:schemeClr val="tx1"/>
-                </a:solidFill>
-              </a:rPr>
-              <a:t>청</a:t>
-            </a:r>
-            <a:r>
-              <a:rPr lang="ko-KR" altLang="en-US" sz="1000" b="1" dirty="0">
-                <a:solidFill>
-                  <a:schemeClr val="tx1"/>
-                </a:solidFill>
-              </a:rPr>
-              <a:t>삭제</a:t>
+              <a:t>신청삭제</a:t>
             </a:r>
           </a:p>
         </p:txBody>
@@ -27538,15 +26926,7 @@
                   <a:srgbClr val="756B5F"/>
                 </a:solidFill>
               </a:rPr>
-              <a:t>작업분할구조</a:t>
-            </a:r>
-            <a:r>
-              <a:rPr lang="ko-KR" altLang="en-US" b="1" dirty="0">
-                <a:solidFill>
-                  <a:srgbClr val="756B5F"/>
-                </a:solidFill>
-              </a:rPr>
-              <a:t>도</a:t>
+              <a:t>작업분할구조도</a:t>
             </a:r>
           </a:p>
         </p:txBody>
@@ -27713,13 +27093,8 @@
             <a:pPr algn="ctr"/>
             <a:r>
               <a:rPr lang="ko-KR" altLang="en-US" sz="1000" b="1" dirty="0"/>
-              <a:t>이용</a:t>
-            </a:r>
-            <a:r>
-              <a:rPr lang="ko-KR" altLang="en-US" sz="1000" b="1" dirty="0"/>
-              <a:t>자</a:t>
-            </a:r>
-            <a:endParaRPr lang="ko-KR" altLang="en-US" sz="1000" b="1" dirty="0"/>
+              <a:t>이용자</a:t>
+            </a:r>
           </a:p>
         </p:txBody>
       </p:sp>
@@ -27950,13 +27325,8 @@
             <a:pPr algn="ctr"/>
             <a:r>
               <a:rPr lang="ko-KR" altLang="en-US" sz="1000" b="1" dirty="0"/>
-              <a:t>관</a:t>
-            </a:r>
-            <a:r>
-              <a:rPr lang="ko-KR" altLang="en-US" sz="1000" b="1" dirty="0"/>
-              <a:t>리</a:t>
-            </a:r>
-            <a:endParaRPr lang="ko-KR" altLang="en-US" sz="1000" b="1" dirty="0"/>
+              <a:t>관리</a:t>
+            </a:r>
           </a:p>
         </p:txBody>
       </p:sp>
@@ -28131,13 +27501,8 @@
             <a:pPr algn="ctr"/>
             <a:r>
               <a:rPr lang="ko-KR" altLang="en-US" sz="1000" b="1" dirty="0"/>
-              <a:t>반</a:t>
-            </a:r>
-            <a:r>
-              <a:rPr lang="ko-KR" altLang="en-US" sz="1000" b="1" dirty="0"/>
-              <a:t>납</a:t>
-            </a:r>
-            <a:endParaRPr lang="ko-KR" altLang="en-US" sz="1000" b="1" dirty="0"/>
+              <a:t>반납</a:t>
+            </a:r>
           </a:p>
         </p:txBody>
       </p:sp>
@@ -28277,21 +27642,8 @@
                   <a:schemeClr val="tx1"/>
                 </a:solidFill>
               </a:rPr>
-              <a:t>삭</a:t>
-            </a:r>
-            <a:r>
-              <a:rPr lang="ko-KR" altLang="en-US" sz="1000" b="1" dirty="0">
-                <a:solidFill>
-                  <a:schemeClr val="tx1"/>
-                </a:solidFill>
-              </a:rPr>
-              <a:t>제</a:t>
-            </a:r>
-            <a:endParaRPr lang="ko-KR" altLang="en-US" sz="1000" b="1" dirty="0">
-              <a:solidFill>
-                <a:schemeClr val="tx1"/>
-              </a:solidFill>
-            </a:endParaRPr>
+              <a:t>삭제</a:t>
+            </a:r>
           </a:p>
         </p:txBody>
       </p:sp>
@@ -28366,21 +27718,8 @@
                   <a:schemeClr val="tx1"/>
                 </a:solidFill>
               </a:rPr>
-              <a:t>강</a:t>
-            </a:r>
-            <a:r>
-              <a:rPr lang="ko-KR" altLang="en-US" sz="1000" b="1" dirty="0">
-                <a:solidFill>
-                  <a:schemeClr val="tx1"/>
-                </a:solidFill>
-              </a:rPr>
-              <a:t>등</a:t>
-            </a:r>
-            <a:endParaRPr lang="ko-KR" altLang="en-US" sz="1000" b="1" dirty="0">
-              <a:solidFill>
-                <a:schemeClr val="tx1"/>
-              </a:solidFill>
-            </a:endParaRPr>
+              <a:t>강등</a:t>
+            </a:r>
           </a:p>
         </p:txBody>
       </p:sp>
@@ -28640,21 +27979,8 @@
                   <a:schemeClr val="tx1"/>
                 </a:solidFill>
               </a:rPr>
-              <a:t>검</a:t>
-            </a:r>
-            <a:r>
-              <a:rPr lang="ko-KR" altLang="en-US" sz="1000" b="1" dirty="0">
-                <a:solidFill>
-                  <a:schemeClr val="tx1"/>
-                </a:solidFill>
-              </a:rPr>
-              <a:t>색</a:t>
-            </a:r>
-            <a:endParaRPr lang="ko-KR" altLang="en-US" sz="1000" b="1" dirty="0">
-              <a:solidFill>
-                <a:schemeClr val="tx1"/>
-              </a:solidFill>
-            </a:endParaRPr>
+              <a:t>검색</a:t>
+            </a:r>
           </a:p>
         </p:txBody>
       </p:sp>
@@ -28729,21 +28055,8 @@
                   <a:schemeClr val="tx1"/>
                 </a:solidFill>
               </a:rPr>
-              <a:t>목</a:t>
-            </a:r>
-            <a:r>
-              <a:rPr lang="ko-KR" altLang="en-US" sz="1000" b="1" dirty="0">
-                <a:solidFill>
-                  <a:schemeClr val="tx1"/>
-                </a:solidFill>
-              </a:rPr>
-              <a:t>록</a:t>
-            </a:r>
-            <a:endParaRPr lang="ko-KR" altLang="en-US" sz="1000" b="1" dirty="0">
-              <a:solidFill>
-                <a:schemeClr val="tx1"/>
-              </a:solidFill>
-            </a:endParaRPr>
+              <a:t>목록</a:t>
+            </a:r>
           </a:p>
         </p:txBody>
       </p:sp>
@@ -29052,21 +28365,8 @@
                   <a:schemeClr val="tx1"/>
                 </a:solidFill>
               </a:rPr>
-              <a:t>도서추</a:t>
-            </a:r>
-            <a:r>
-              <a:rPr lang="ko-KR" altLang="en-US" sz="1000" b="1" dirty="0">
-                <a:solidFill>
-                  <a:schemeClr val="tx1"/>
-                </a:solidFill>
-              </a:rPr>
-              <a:t>천</a:t>
-            </a:r>
-            <a:endParaRPr lang="ko-KR" altLang="en-US" sz="1000" b="1" dirty="0">
-              <a:solidFill>
-                <a:schemeClr val="tx1"/>
-              </a:solidFill>
-            </a:endParaRPr>
+              <a:t>도서추천</a:t>
+            </a:r>
           </a:p>
         </p:txBody>
       </p:sp>
@@ -30502,13 +29802,7 @@
               <a:rPr lang="ko-KR" altLang="en-US" sz="1100" b="1" dirty="0">
                 <a:latin typeface="+mn-ea"/>
               </a:rPr>
-              <a:t>■ </a:t>
-            </a:r>
-            <a:r>
-              <a:rPr lang="ko-KR" altLang="en-US" sz="1100" b="1" dirty="0">
-                <a:latin typeface="+mn-ea"/>
-              </a:rPr>
-              <a:t>소프트웨어 설계</a:t>
+              <a:t>■ 소프트웨어 설계</a:t>
             </a:r>
             <a:endParaRPr lang="en-US" altLang="ko-KR" sz="1100" b="1" dirty="0">
               <a:latin typeface="+mn-ea"/>
@@ -30723,9 +30017,6 @@
               </a:rPr>
               <a:t>)</a:t>
             </a:r>
-            <a:endParaRPr lang="en-US" altLang="ko-KR" sz="1000" b="1" dirty="0">
-              <a:latin typeface="+mn-ea"/>
-            </a:endParaRPr>
           </a:p>
           <a:p>
             <a:pPr>
@@ -30775,13 +30066,7 @@
               <a:rPr lang="ko-KR" altLang="en-US" sz="1000" b="1" dirty="0">
                 <a:latin typeface="+mn-ea"/>
               </a:rPr>
-              <a:t>■ </a:t>
-            </a:r>
-            <a:r>
-              <a:rPr lang="ko-KR" altLang="en-US" sz="1000" b="1" dirty="0">
-                <a:latin typeface="+mn-ea"/>
-              </a:rPr>
-              <a:t>관리자 등록 삭제</a:t>
+              <a:t>■ 관리자 등록 삭제</a:t>
             </a:r>
             <a:r>
               <a:rPr lang="en-US" altLang="ko-KR" sz="1000" b="1" dirty="0">
@@ -30818,13 +30103,7 @@
               <a:rPr lang="ko-KR" altLang="en-US" sz="1000" b="1" dirty="0">
                 <a:latin typeface="+mn-ea"/>
               </a:rPr>
-              <a:t>■ </a:t>
-            </a:r>
-            <a:r>
-              <a:rPr lang="ko-KR" altLang="en-US" sz="1000" b="1" dirty="0">
-                <a:latin typeface="+mn-ea"/>
-              </a:rPr>
-              <a:t>회원강등</a:t>
+              <a:t>■ 회원강등</a:t>
             </a:r>
             <a:r>
               <a:rPr lang="en-US" altLang="ko-KR" sz="1000" b="1" dirty="0">
@@ -31082,13 +30361,7 @@
               <a:rPr lang="en-US" altLang="ko-KR" sz="1100" dirty="0">
                 <a:latin typeface="+mn-ea"/>
               </a:rPr>
-              <a:t>, </a:t>
-            </a:r>
-            <a:r>
-              <a:rPr lang="en-US" altLang="ko-KR" sz="1100" dirty="0">
-                <a:latin typeface="+mn-ea"/>
-              </a:rPr>
-              <a:t>UML</a:t>
+              <a:t>, UML</a:t>
             </a:r>
           </a:p>
           <a:p>
@@ -31136,13 +30409,7 @@
               <a:rPr lang="en-US" altLang="ko-KR" sz="1100" dirty="0">
                 <a:latin typeface="+mn-ea"/>
               </a:rPr>
-              <a:t> </a:t>
-            </a:r>
-            <a:r>
-              <a:rPr lang="en-US" altLang="ko-KR" sz="1100" dirty="0">
-                <a:latin typeface="+mn-ea"/>
-              </a:rPr>
-              <a:t>-</a:t>
+              <a:t> -</a:t>
             </a:r>
             <a:r>
               <a:rPr lang="ko-KR" altLang="en-US" sz="1100" dirty="0">
@@ -31235,13 +30502,7 @@
               <a:rPr lang="en-US" altLang="ko-KR" sz="1000" dirty="0">
                 <a:latin typeface="+mn-ea"/>
               </a:rPr>
-              <a:t>  </a:t>
-            </a:r>
-            <a:r>
-              <a:rPr lang="en-US" altLang="ko-KR" sz="1000" dirty="0">
-                <a:latin typeface="+mn-ea"/>
-              </a:rPr>
-              <a:t>-</a:t>
+              <a:t>  -</a:t>
             </a:r>
             <a:r>
               <a:rPr lang="ko-KR" altLang="en-US" sz="1000" dirty="0">
@@ -31317,13 +30578,7 @@
               <a:rPr lang="ko-KR" altLang="en-US" sz="1100" b="1" dirty="0">
                 <a:latin typeface="+mn-ea"/>
               </a:rPr>
-              <a:t>■ </a:t>
-            </a:r>
-            <a:r>
-              <a:rPr lang="ko-KR" altLang="en-US" sz="1100" b="1" dirty="0">
-                <a:latin typeface="+mn-ea"/>
-              </a:rPr>
-              <a:t>도서검색</a:t>
+              <a:t>■ 도서검색</a:t>
             </a:r>
             <a:r>
               <a:rPr lang="en-US" altLang="ko-KR" sz="1100" b="1" dirty="0">
@@ -31509,9 +30764,6 @@
               </a:rPr>
               <a:t>)</a:t>
             </a:r>
-            <a:endParaRPr lang="en-US" altLang="ko-KR" sz="1000" b="1" dirty="0">
-              <a:latin typeface="+mn-ea"/>
-            </a:endParaRPr>
           </a:p>
         </p:txBody>
       </p:sp>
@@ -31553,11 +30805,6 @@
               </a:rPr>
               <a:t>업무분장</a:t>
             </a:r>
-            <a:endParaRPr lang="ko-KR" altLang="en-US" b="1" dirty="0">
-              <a:solidFill>
-                <a:srgbClr val="756B5F"/>
-              </a:solidFill>
-            </a:endParaRPr>
           </a:p>
         </p:txBody>
       </p:sp>
@@ -31623,11 +30870,7 @@
               </a:pPr>
               <a:r>
                 <a:rPr lang="ko-KR" altLang="en-US" sz="1400" b="1"/>
-                <a:t>이</a:t>
-              </a:r>
-              <a:r>
-                <a:rPr lang="ko-KR" altLang="en-US" sz="1400" b="1"/>
-                <a:t>무개</a:t>
+                <a:t>이무개</a:t>
               </a:r>
               <a:endParaRPr lang="ko-KR" altLang="en-US" sz="1400" b="1" dirty="0"/>
             </a:p>
@@ -31711,13 +30954,7 @@
               <a:rPr lang="ko-KR" altLang="en-US" sz="1100" b="1" dirty="0">
                 <a:latin typeface="+mn-ea"/>
               </a:rPr>
-              <a:t>■ </a:t>
-            </a:r>
-            <a:r>
-              <a:rPr lang="ko-KR" altLang="en-US" sz="1100" b="1" dirty="0">
-                <a:latin typeface="+mn-ea"/>
-              </a:rPr>
-              <a:t>소프트웨어 설계</a:t>
+              <a:t>■ 소프트웨어 설계</a:t>
             </a:r>
             <a:endParaRPr lang="en-US" altLang="ko-KR" sz="1100" b="1" dirty="0">
               <a:latin typeface="+mn-ea"/>
@@ -31938,9 +31175,6 @@
               </a:rPr>
               <a:t>)</a:t>
             </a:r>
-            <a:endParaRPr lang="en-US" altLang="ko-KR" sz="1000" b="1" dirty="0">
-              <a:latin typeface="+mn-ea"/>
-            </a:endParaRPr>
           </a:p>
           <a:p>
             <a:pPr>
@@ -31990,13 +31224,7 @@
               <a:rPr lang="ko-KR" altLang="en-US" sz="1000" b="1" dirty="0">
                 <a:latin typeface="+mn-ea"/>
               </a:rPr>
-              <a:t>■ </a:t>
-            </a:r>
-            <a:r>
-              <a:rPr lang="ko-KR" altLang="en-US" sz="1000" b="1" dirty="0">
-                <a:latin typeface="+mn-ea"/>
-              </a:rPr>
-              <a:t>관리자 등록 삭제</a:t>
+              <a:t>■ 관리자 등록 삭제</a:t>
             </a:r>
             <a:r>
               <a:rPr lang="en-US" altLang="ko-KR" sz="1000" b="1" dirty="0">
@@ -32033,13 +31261,7 @@
               <a:rPr lang="ko-KR" altLang="en-US" sz="1000" b="1" dirty="0">
                 <a:latin typeface="+mn-ea"/>
               </a:rPr>
-              <a:t>■ </a:t>
-            </a:r>
-            <a:r>
-              <a:rPr lang="ko-KR" altLang="en-US" sz="1000" b="1" dirty="0">
-                <a:latin typeface="+mn-ea"/>
-              </a:rPr>
-              <a:t>회원강등</a:t>
+              <a:t>■ 회원강등</a:t>
             </a:r>
             <a:r>
               <a:rPr lang="en-US" altLang="ko-KR" sz="1000" b="1" dirty="0">
@@ -32301,13 +31523,7 @@
               <a:rPr lang="en-US" altLang="ko-KR" sz="1100" dirty="0">
                 <a:latin typeface="+mn-ea"/>
               </a:rPr>
-              <a:t>, </a:t>
-            </a:r>
-            <a:r>
-              <a:rPr lang="en-US" altLang="ko-KR" sz="1100" dirty="0">
-                <a:latin typeface="+mn-ea"/>
-              </a:rPr>
-              <a:t>UML</a:t>
+              <a:t>, UML</a:t>
             </a:r>
           </a:p>
           <a:p>
@@ -32355,13 +31571,7 @@
               <a:rPr lang="en-US" altLang="ko-KR" sz="1100" dirty="0">
                 <a:latin typeface="+mn-ea"/>
               </a:rPr>
-              <a:t> </a:t>
-            </a:r>
-            <a:r>
-              <a:rPr lang="en-US" altLang="ko-KR" sz="1100" dirty="0">
-                <a:latin typeface="+mn-ea"/>
-              </a:rPr>
-              <a:t>-</a:t>
+              <a:t> -</a:t>
             </a:r>
             <a:r>
               <a:rPr lang="ko-KR" altLang="en-US" sz="1100" dirty="0">
@@ -32454,13 +31664,7 @@
               <a:rPr lang="en-US" altLang="ko-KR" sz="1000" dirty="0">
                 <a:latin typeface="+mn-ea"/>
               </a:rPr>
-              <a:t>  </a:t>
-            </a:r>
-            <a:r>
-              <a:rPr lang="en-US" altLang="ko-KR" sz="1000" dirty="0">
-                <a:latin typeface="+mn-ea"/>
-              </a:rPr>
-              <a:t>-</a:t>
+              <a:t>  -</a:t>
             </a:r>
             <a:r>
               <a:rPr lang="ko-KR" altLang="en-US" sz="1000" dirty="0">
@@ -32536,13 +31740,7 @@
               <a:rPr lang="ko-KR" altLang="en-US" sz="1100" b="1" dirty="0">
                 <a:latin typeface="+mn-ea"/>
               </a:rPr>
-              <a:t>■ </a:t>
-            </a:r>
-            <a:r>
-              <a:rPr lang="ko-KR" altLang="en-US" sz="1100" b="1" dirty="0">
-                <a:latin typeface="+mn-ea"/>
-              </a:rPr>
-              <a:t>도서검색</a:t>
+              <a:t>■ 도서검색</a:t>
             </a:r>
             <a:r>
               <a:rPr lang="en-US" altLang="ko-KR" sz="1100" b="1" dirty="0">
@@ -32728,9 +31926,6 @@
               </a:rPr>
               <a:t>)</a:t>
             </a:r>
-            <a:endParaRPr lang="en-US" altLang="ko-KR" sz="1000" b="1" dirty="0">
-              <a:latin typeface="+mn-ea"/>
-            </a:endParaRPr>
           </a:p>
         </p:txBody>
       </p:sp>
@@ -32833,11 +32028,6 @@
               </a:rPr>
               <a:t>를 이용한 일정관리</a:t>
             </a:r>
-            <a:endParaRPr lang="ko-KR" altLang="en-US" b="1" dirty="0">
-              <a:solidFill>
-                <a:srgbClr val="756B5F"/>
-              </a:solidFill>
-            </a:endParaRPr>
           </a:p>
         </p:txBody>
       </p:sp>

</xml_diff>